<commit_message>
why is a summary required though
</commit_message>
<xml_diff>
--- a/M2R_presentation.pptx
+++ b/M2R_presentation.pptx
@@ -153,7 +153,7 @@
         <p:txBody>
           <a:bodyPr/>
           <a:p>
-            <a:fld id="{0F67F7FD-209F-4B67-B7DE-FEF644587BFD}" type="slidenum">
+            <a:fld id="{885C7E0D-7BE0-489F-98AA-B34C4BB0EAD2}" type="slidenum">
               <a:t>&lt;#&gt;</a:t>
             </a:fld>
           </a:p>
@@ -236,7 +236,7 @@
         <p:txBody>
           <a:bodyPr/>
           <a:p>
-            <a:fld id="{A9F58435-B0CA-41BE-96E7-47B17B750B91}" type="slidenum">
+            <a:fld id="{FD096149-F047-4049-95DD-B4F3E336CD67}" type="slidenum">
               <a:t>&lt;#&gt;</a:t>
             </a:fld>
           </a:p>
@@ -341,7 +341,7 @@
         <p:txBody>
           <a:bodyPr/>
           <a:p>
-            <a:fld id="{78A5BBD3-49EE-43A5-84BE-FF9C0DA4CDB9}" type="slidenum">
+            <a:fld id="{49D21FEC-555D-4E98-B879-60321BE3D03E}" type="slidenum">
               <a:t>&lt;#&gt;</a:t>
             </a:fld>
           </a:p>
@@ -424,7 +424,7 @@
         <p:txBody>
           <a:bodyPr/>
           <a:p>
-            <a:fld id="{35F3D247-2243-4AB5-99E7-08EE5F63DDAD}" type="slidenum">
+            <a:fld id="{9A30E294-B0CB-40FE-82BA-0C3F64F106B2}" type="slidenum">
               <a:t>&lt;#&gt;</a:t>
             </a:fld>
           </a:p>
@@ -507,7 +507,7 @@
         <p:txBody>
           <a:bodyPr/>
           <a:p>
-            <a:fld id="{14AF295E-9B8E-4737-B314-1D921A521BEB}" type="slidenum">
+            <a:fld id="{928A159A-A088-419A-A294-0A8340D4021C}" type="slidenum">
               <a:t>&lt;#&gt;</a:t>
             </a:fld>
           </a:p>
@@ -590,7 +590,7 @@
         <p:txBody>
           <a:bodyPr/>
           <a:p>
-            <a:fld id="{9A1BFC96-8877-45F4-BC25-6E726201661A}" type="slidenum">
+            <a:fld id="{60C5D14A-3F97-49C1-B156-2272CE8D27F2}" type="slidenum">
               <a:t>&lt;#&gt;</a:t>
             </a:fld>
           </a:p>
@@ -673,7 +673,7 @@
         <p:txBody>
           <a:bodyPr/>
           <a:p>
-            <a:fld id="{82449A52-C5DD-4693-9E86-BE0ADB80449B}" type="slidenum">
+            <a:fld id="{1985DDCF-4805-4172-B520-ABA58F5902AB}" type="slidenum">
               <a:t>&lt;#&gt;</a:t>
             </a:fld>
           </a:p>
@@ -756,7 +756,7 @@
         <p:txBody>
           <a:bodyPr/>
           <a:p>
-            <a:fld id="{C483E0C6-EBC6-4536-B746-19B7767E1D11}" type="slidenum">
+            <a:fld id="{9589E9EC-39EA-4113-9F04-84252D2520B1}" type="slidenum">
               <a:t>&lt;#&gt;</a:t>
             </a:fld>
           </a:p>
@@ -839,7 +839,7 @@
         <p:txBody>
           <a:bodyPr/>
           <a:p>
-            <a:fld id="{AF12427A-A9A5-4C12-948B-A51533F5C878}" type="slidenum">
+            <a:fld id="{EC9D7F19-F05F-4A62-84B7-D39A2E1E5A06}" type="slidenum">
               <a:t>&lt;#&gt;</a:t>
             </a:fld>
           </a:p>
@@ -922,7 +922,7 @@
         <p:txBody>
           <a:bodyPr/>
           <a:p>
-            <a:fld id="{A7FCB407-B697-4B8D-A26A-D4069093C794}" type="slidenum">
+            <a:fld id="{A2420554-8677-4E1E-8409-E17584BB1952}" type="slidenum">
               <a:t>&lt;#&gt;</a:t>
             </a:fld>
           </a:p>
@@ -1005,7 +1005,7 @@
         <p:txBody>
           <a:bodyPr/>
           <a:p>
-            <a:fld id="{71A43327-CE29-43BE-8691-6D3CE2204A61}" type="slidenum">
+            <a:fld id="{409C72BA-7F84-430B-BB70-FCD2A4B6C681}" type="slidenum">
               <a:t>&lt;#&gt;</a:t>
             </a:fld>
           </a:p>
@@ -1088,7 +1088,7 @@
         <p:txBody>
           <a:bodyPr/>
           <a:p>
-            <a:fld id="{24320A19-3A7B-4E20-8D87-922A2F8F96B3}" type="slidenum">
+            <a:fld id="{429F4A77-701C-4209-B158-E55FCD7377DA}" type="slidenum">
               <a:t>&lt;#&gt;</a:t>
             </a:fld>
           </a:p>
@@ -1171,7 +1171,7 @@
         <p:txBody>
           <a:bodyPr/>
           <a:p>
-            <a:fld id="{E07543FA-016B-4BF9-A10E-EEE78462BAFD}" type="slidenum">
+            <a:fld id="{9E96C608-0818-446A-B01F-5D1A2DA49FDF}" type="slidenum">
               <a:t>&lt;#&gt;</a:t>
             </a:fld>
           </a:p>
@@ -1276,7 +1276,7 @@
         <p:txBody>
           <a:bodyPr/>
           <a:p>
-            <a:fld id="{CFAFD0FB-37B1-49BA-B593-0D24CDA4B91E}" type="slidenum">
+            <a:fld id="{66F64B84-080D-41B4-A523-21DCB04907D1}" type="slidenum">
               <a:t>&lt;#&gt;</a:t>
             </a:fld>
           </a:p>
@@ -1359,7 +1359,7 @@
         <p:txBody>
           <a:bodyPr/>
           <a:p>
-            <a:fld id="{A10EBD4F-7C6A-4416-9949-AF8FE0D31FD5}" type="slidenum">
+            <a:fld id="{841D60F4-1E7E-4869-9D68-D9A57ECA45BA}" type="slidenum">
               <a:t>&lt;#&gt;</a:t>
             </a:fld>
           </a:p>
@@ -1442,7 +1442,7 @@
         <p:txBody>
           <a:bodyPr/>
           <a:p>
-            <a:fld id="{9C6BD9B0-7449-4995-840B-EEAD68B39438}" type="slidenum">
+            <a:fld id="{64B79B90-C77E-4780-BEFF-BBCE63DD49E4}" type="slidenum">
               <a:t>&lt;#&gt;</a:t>
             </a:fld>
           </a:p>
@@ -1525,7 +1525,7 @@
         <p:txBody>
           <a:bodyPr/>
           <a:p>
-            <a:fld id="{7C192EA0-F8BE-47E5-A74C-FE603160B1FA}" type="slidenum">
+            <a:fld id="{BCE908AB-B4AB-4AFF-BF6B-60E3AA43CE6B}" type="slidenum">
               <a:t>&lt;#&gt;</a:t>
             </a:fld>
           </a:p>
@@ -1608,7 +1608,7 @@
         <p:txBody>
           <a:bodyPr/>
           <a:p>
-            <a:fld id="{C670DEC3-A129-4A3B-BCED-441088D78B10}" type="slidenum">
+            <a:fld id="{23FA8F53-0868-42F6-93E2-F2F8286D659F}" type="slidenum">
               <a:t>&lt;#&gt;</a:t>
             </a:fld>
           </a:p>
@@ -1691,7 +1691,7 @@
         <p:txBody>
           <a:bodyPr/>
           <a:p>
-            <a:fld id="{464C3349-412A-4BBB-AEFA-3858913DF859}" type="slidenum">
+            <a:fld id="{E1DB3FA0-2C93-417F-B5DB-F4C85F3D0B57}" type="slidenum">
               <a:t>&lt;#&gt;</a:t>
             </a:fld>
           </a:p>
@@ -1774,7 +1774,7 @@
         <p:txBody>
           <a:bodyPr/>
           <a:p>
-            <a:fld id="{F3CA795D-5D53-4C70-8DE3-C505B24148DF}" type="slidenum">
+            <a:fld id="{4C4B61F2-AE6C-41AD-A023-E60098EF25D8}" type="slidenum">
               <a:t>&lt;#&gt;</a:t>
             </a:fld>
           </a:p>
@@ -1857,7 +1857,7 @@
         <p:txBody>
           <a:bodyPr/>
           <a:p>
-            <a:fld id="{9C6764FD-0AC7-4B70-9A13-4B31EBD8027F}" type="slidenum">
+            <a:fld id="{C5E82138-F722-4ACD-8AA8-C9C6E246AB91}" type="slidenum">
               <a:t>&lt;#&gt;</a:t>
             </a:fld>
           </a:p>
@@ -1940,7 +1940,7 @@
         <p:txBody>
           <a:bodyPr/>
           <a:p>
-            <a:fld id="{4B96F10E-AF44-4A9B-A931-3041091BD9FD}" type="slidenum">
+            <a:fld id="{2E53D114-FBC5-46FD-BE3A-768020E993CC}" type="slidenum">
               <a:t>&lt;#&gt;</a:t>
             </a:fld>
           </a:p>
@@ -2023,7 +2023,7 @@
         <p:txBody>
           <a:bodyPr/>
           <a:p>
-            <a:fld id="{36659675-3553-462E-81F4-93AAC6CD733E}" type="slidenum">
+            <a:fld id="{84BC0300-BD19-468A-9616-E42EC1D1FCF3}" type="slidenum">
               <a:t>&lt;#&gt;</a:t>
             </a:fld>
           </a:p>
@@ -2106,7 +2106,7 @@
         <p:txBody>
           <a:bodyPr/>
           <a:p>
-            <a:fld id="{DF82D946-955A-405B-94A1-9A93005784EC}" type="slidenum">
+            <a:fld id="{F5B48108-8BFE-4E79-B0D6-7E7F1752BCB1}" type="slidenum">
               <a:t>&lt;#&gt;</a:t>
             </a:fld>
           </a:p>
@@ -2211,7 +2211,7 @@
         <p:txBody>
           <a:bodyPr/>
           <a:p>
-            <a:fld id="{1F3D4E56-5D86-46D9-BF87-DE09DC37F79F}" type="slidenum">
+            <a:fld id="{3E88D950-5711-45FE-AD8E-5E63E8F931D6}" type="slidenum">
               <a:t>&lt;#&gt;</a:t>
             </a:fld>
           </a:p>
@@ -2294,7 +2294,7 @@
         <p:txBody>
           <a:bodyPr/>
           <a:p>
-            <a:fld id="{F3909FA0-2830-4EE4-B2A6-85AD1D982BD4}" type="slidenum">
+            <a:fld id="{CD1DA935-EE78-4ECF-8ED0-C4B37542E5EA}" type="slidenum">
               <a:t>&lt;#&gt;</a:t>
             </a:fld>
           </a:p>
@@ -2377,7 +2377,7 @@
         <p:txBody>
           <a:bodyPr/>
           <a:p>
-            <a:fld id="{9885CE54-9539-4B95-9270-BD1002EAA4D6}" type="slidenum">
+            <a:fld id="{C7B3F08B-8459-490D-A09D-7CD1F5043F68}" type="slidenum">
               <a:t>&lt;#&gt;</a:t>
             </a:fld>
           </a:p>
@@ -2460,7 +2460,7 @@
         <p:txBody>
           <a:bodyPr/>
           <a:p>
-            <a:fld id="{44D5C46B-716A-4811-A1B6-48DF61ACC7C9}" type="slidenum">
+            <a:fld id="{ACAEAE2E-B685-4A5D-A3E7-8577C19E5A84}" type="slidenum">
               <a:t>&lt;#&gt;</a:t>
             </a:fld>
           </a:p>
@@ -2543,7 +2543,7 @@
         <p:txBody>
           <a:bodyPr/>
           <a:p>
-            <a:fld id="{EB11F48B-3C85-416B-A17E-9B7CEE178233}" type="slidenum">
+            <a:fld id="{58BA216A-0AD3-4683-8BDF-ED4F33710E4B}" type="slidenum">
               <a:t>&lt;#&gt;</a:t>
             </a:fld>
           </a:p>
@@ -2626,7 +2626,7 @@
         <p:txBody>
           <a:bodyPr/>
           <a:p>
-            <a:fld id="{68B10801-AB6C-41D9-81E8-D857A854C2AE}" type="slidenum">
+            <a:fld id="{F8EBC350-E3BF-4125-AEA9-16F6C7F35F0D}" type="slidenum">
               <a:t>&lt;#&gt;</a:t>
             </a:fld>
           </a:p>
@@ -2709,7 +2709,7 @@
         <p:txBody>
           <a:bodyPr/>
           <a:p>
-            <a:fld id="{0656828C-48E7-4C8A-8C61-645798F32BF5}" type="slidenum">
+            <a:fld id="{B8F40B09-6C0C-4064-B4C3-1C2322685B63}" type="slidenum">
               <a:t>&lt;#&gt;</a:t>
             </a:fld>
           </a:p>
@@ -2792,7 +2792,7 @@
         <p:txBody>
           <a:bodyPr/>
           <a:p>
-            <a:fld id="{C7B7753B-12FB-4A69-AB9F-1B0031A23B65}" type="slidenum">
+            <a:fld id="{F998FD4F-0F0F-4A48-A78B-D67DE6F94E55}" type="slidenum">
               <a:t>&lt;#&gt;</a:t>
             </a:fld>
           </a:p>
@@ -2875,7 +2875,7 @@
         <p:txBody>
           <a:bodyPr/>
           <a:p>
-            <a:fld id="{F01CAF8B-A9B2-4271-92B7-A3E21D019546}" type="slidenum">
+            <a:fld id="{C21253B4-AD1B-43F7-9636-663F41F704C4}" type="slidenum">
               <a:t>&lt;#&gt;</a:t>
             </a:fld>
           </a:p>
@@ -3112,7 +3112,7 @@
         <p:txBody>
           <a:bodyPr/>
           <a:p>
-            <a:fld id="{78A50D99-BFCA-4876-B40A-1C206653965F}" type="slidenum">
+            <a:fld id="{1E1305F1-6576-4EF2-A641-1DCD4C3E441A}" type="slidenum">
               <a:t>&lt;#&gt;</a:t>
             </a:fld>
           </a:p>
@@ -3283,7 +3283,7 @@
         <p:txBody>
           <a:bodyPr/>
           <a:p>
-            <a:fld id="{FAF2257B-06FD-4BC6-8632-694E12B67C97}" type="slidenum">
+            <a:fld id="{FED06C92-1B8E-461F-AEBB-2CD30A2D8CA8}" type="slidenum">
               <a:t>&lt;#&gt;</a:t>
             </a:fld>
           </a:p>
@@ -3366,7 +3366,7 @@
         <p:txBody>
           <a:bodyPr/>
           <a:p>
-            <a:fld id="{1022FE9F-6127-4761-B5CE-344CB336E89F}" type="slidenum">
+            <a:fld id="{AAAC77E2-BD10-4397-BBA8-0992B8B52D95}" type="slidenum">
               <a:t>&lt;#&gt;</a:t>
             </a:fld>
           </a:p>
@@ -3449,7 +3449,7 @@
         <p:txBody>
           <a:bodyPr/>
           <a:p>
-            <a:fld id="{57FAB8FB-CD2E-42DB-BB43-E7E8D53C798E}" type="slidenum">
+            <a:fld id="{BA170042-FE13-463D-967B-22F871A59256}" type="slidenum">
               <a:t>&lt;#&gt;</a:t>
             </a:fld>
           </a:p>
@@ -3532,7 +3532,7 @@
         <p:txBody>
           <a:bodyPr/>
           <a:p>
-            <a:fld id="{EBE075FA-C160-4E0F-A44C-A499428D0C33}" type="slidenum">
+            <a:fld id="{95793F28-5A07-439E-A6EE-F83C07790822}" type="slidenum">
               <a:t>&lt;#&gt;</a:t>
             </a:fld>
           </a:p>
@@ -3615,7 +3615,7 @@
         <p:txBody>
           <a:bodyPr/>
           <a:p>
-            <a:fld id="{ED4785E7-7E6B-4D99-AF9D-9D280D080B16}" type="slidenum">
+            <a:fld id="{21132C84-8B74-4085-9554-C7FA44862303}" type="slidenum">
               <a:t>&lt;#&gt;</a:t>
             </a:fld>
           </a:p>
@@ -3698,7 +3698,7 @@
         <p:txBody>
           <a:bodyPr/>
           <a:p>
-            <a:fld id="{FD140244-2C4C-467F-8EF5-368D5C0FAC2B}" type="slidenum">
+            <a:fld id="{9DCAD386-EF52-4617-8E46-8677DF3C7D60}" type="slidenum">
               <a:t>&lt;#&gt;</a:t>
             </a:fld>
           </a:p>
@@ -3781,7 +3781,7 @@
         <p:txBody>
           <a:bodyPr/>
           <a:p>
-            <a:fld id="{2CF22615-0CB0-4FB7-B787-6278589CA2B7}" type="slidenum">
+            <a:fld id="{061F94B8-82D2-4E0F-A9BE-7551FD251149}" type="slidenum">
               <a:t>&lt;#&gt;</a:t>
             </a:fld>
           </a:p>
@@ -3864,7 +3864,7 @@
         <p:txBody>
           <a:bodyPr/>
           <a:p>
-            <a:fld id="{7804742C-61B6-47D2-A6F7-F1D4B62B9111}" type="slidenum">
+            <a:fld id="{97103A6D-30DA-4101-A3B4-0BE29D40556E}" type="slidenum">
               <a:t>&lt;#&gt;</a:t>
             </a:fld>
           </a:p>
@@ -3947,7 +3947,7 @@
         <p:txBody>
           <a:bodyPr/>
           <a:p>
-            <a:fld id="{18977235-F55F-432A-BD70-4B593BF6CAAD}" type="slidenum">
+            <a:fld id="{519BABCE-E077-496A-9D20-BBCDB6D36A57}" type="slidenum">
               <a:t>&lt;#&gt;</a:t>
             </a:fld>
           </a:p>
@@ -4030,7 +4030,7 @@
         <p:txBody>
           <a:bodyPr/>
           <a:p>
-            <a:fld id="{3D9BA851-17E5-4370-B732-ECC5DEFA3AE2}" type="slidenum">
+            <a:fld id="{1C1E92EC-5D4A-4245-AF14-9DA761ED1E24}" type="slidenum">
               <a:t>&lt;#&gt;</a:t>
             </a:fld>
           </a:p>
@@ -4113,7 +4113,7 @@
         <p:txBody>
           <a:bodyPr/>
           <a:p>
-            <a:fld id="{D60C368F-2F3B-4B9A-AC63-39201A1A3558}" type="slidenum">
+            <a:fld id="{1965EA46-9F9E-4F7A-AB11-FA44BCE0A59E}" type="slidenum">
               <a:t>&lt;#&gt;</a:t>
             </a:fld>
           </a:p>
@@ -4240,7 +4240,7 @@
         <p:txBody>
           <a:bodyPr/>
           <a:p>
-            <a:fld id="{8F4C4EE1-1722-476E-A3D2-D1932DE18540}" type="slidenum">
+            <a:fld id="{A256C1F6-ADA3-4980-9019-A14D6C5C521A}" type="slidenum">
               <a:t>&lt;#&gt;</a:t>
             </a:fld>
           </a:p>
@@ -4323,7 +4323,7 @@
         <p:txBody>
           <a:bodyPr/>
           <a:p>
-            <a:fld id="{916B1022-FCF8-437F-9499-5DB9900D738D}" type="slidenum">
+            <a:fld id="{488F50C6-618E-4B51-BC4E-A132EE70B680}" type="slidenum">
               <a:t>&lt;#&gt;</a:t>
             </a:fld>
           </a:p>
@@ -4406,7 +4406,7 @@
         <p:txBody>
           <a:bodyPr/>
           <a:p>
-            <a:fld id="{DE643F3E-AFB1-4A15-A3CA-B93EC3AC20B1}" type="slidenum">
+            <a:fld id="{33137F86-4A3F-41FE-9278-780348C0D70C}" type="slidenum">
               <a:t>&lt;#&gt;</a:t>
             </a:fld>
           </a:p>
@@ -5896,7 +5896,7 @@
                 <a:tab algn="l" pos="0"/>
               </a:tabLst>
             </a:pPr>
-            <a:fld id="{3CBC4832-82BD-40C3-9DE5-082068902CFC}" type="slidenum">
+            <a:fld id="{E0EBFE90-C31B-411E-AB14-1988C8E613F3}" type="slidenum">
               <a:rPr b="1" lang="en-GB" sz="850" strike="noStrike" u="none">
                 <a:solidFill>
                   <a:schemeClr val="accent1"/>
@@ -6197,7 +6197,7 @@
                 <a:tab algn="l" pos="0"/>
               </a:tabLst>
             </a:pPr>
-            <a:fld id="{8E09F32B-75CD-406E-98EB-54BCA49A329E}" type="slidenum">
+            <a:fld id="{49C6A626-B8B7-4529-88C8-5CD0874043A1}" type="slidenum">
               <a:rPr b="1" lang="en-GB" sz="850" strike="noStrike" u="none">
                 <a:solidFill>
                   <a:schemeClr val="accent1"/>
@@ -7457,7 +7457,7 @@
                 <a:tab algn="l" pos="0"/>
               </a:tabLst>
             </a:pPr>
-            <a:fld id="{A46748AB-5017-42D0-879D-20BC59970808}" type="slidenum">
+            <a:fld id="{140E9092-28EC-49AC-81E7-3AF791E657D9}" type="slidenum">
               <a:rPr b="1" lang="en-GB" sz="850" strike="noStrike" u="none">
                 <a:solidFill>
                   <a:schemeClr val="accent1"/>
@@ -7758,7 +7758,7 @@
                 <a:tab algn="l" pos="0"/>
               </a:tabLst>
             </a:pPr>
-            <a:fld id="{8D4CAF10-9296-4F6F-944B-36A597A031CB}" type="slidenum">
+            <a:fld id="{C36B9DD7-71C1-4726-9765-31DE436402EB}" type="slidenum">
               <a:rPr b="1" lang="en-GB" sz="850" strike="noStrike" u="none">
                 <a:solidFill>
                   <a:schemeClr val="accent1"/>
@@ -8059,7 +8059,7 @@
                 <a:tab algn="l" pos="0"/>
               </a:tabLst>
             </a:pPr>
-            <a:fld id="{84925E2E-0D0A-4F44-B093-861169B9082F}" type="slidenum">
+            <a:fld id="{1FD96505-76EC-4DC6-8C21-3BC56128C77F}" type="slidenum">
               <a:rPr b="1" lang="en-GB" sz="850" strike="noStrike" u="none">
                 <a:solidFill>
                   <a:schemeClr val="accent1"/>
@@ -8360,7 +8360,7 @@
                 <a:tab algn="l" pos="0"/>
               </a:tabLst>
             </a:pPr>
-            <a:fld id="{362B879D-CDBB-4B1B-9BF2-01E43B9C72E5}" type="slidenum">
+            <a:fld id="{61504ADB-D565-48C3-A2CD-22B964F90C16}" type="slidenum">
               <a:rPr b="1" lang="en-GB" sz="850" strike="noStrike" u="none">
                 <a:solidFill>
                   <a:schemeClr val="accent1"/>
@@ -8661,7 +8661,7 @@
                 <a:tab algn="l" pos="0"/>
               </a:tabLst>
             </a:pPr>
-            <a:fld id="{4F22B236-2CB0-452D-A30E-54785CA94BAE}" type="slidenum">
+            <a:fld id="{BE935054-0D81-4F19-BEB8-7A80616E6CF7}" type="slidenum">
               <a:rPr b="1" lang="en-GB" sz="850" strike="noStrike" u="none">
                 <a:solidFill>
                   <a:schemeClr val="accent1"/>
@@ -9017,7 +9017,7 @@
                 <a:tab algn="l" pos="0"/>
               </a:tabLst>
             </a:pPr>
-            <a:fld id="{1DB6CB0C-EB27-4C9A-8B1F-6BA95BADD281}" type="slidenum">
+            <a:fld id="{0AA48F52-97B1-46AE-A761-27CD1FCF5D49}" type="slidenum">
               <a:rPr b="1" lang="en-GB" sz="850" strike="noStrike" u="none">
                 <a:solidFill>
                   <a:schemeClr val="lt1"/>
@@ -9318,7 +9318,7 @@
                 <a:tab algn="l" pos="0"/>
               </a:tabLst>
             </a:pPr>
-            <a:fld id="{8E1003FF-F4B5-423E-959A-F06623098DF4}" type="slidenum">
+            <a:fld id="{ED32148C-19F0-4E8B-856E-8ABA293971A2}" type="slidenum">
               <a:rPr b="1" lang="en-GB" sz="850" strike="noStrike" u="none">
                 <a:solidFill>
                   <a:schemeClr val="accent1"/>
@@ -9619,7 +9619,7 @@
                 <a:tab algn="l" pos="0"/>
               </a:tabLst>
             </a:pPr>
-            <a:fld id="{850C0B9C-E07C-4F36-A869-4041F62F7A5C}" type="slidenum">
+            <a:fld id="{DD8FB0C6-C61C-428F-B312-6737FCE3ADDD}" type="slidenum">
               <a:rPr b="1" lang="en-GB" sz="850" strike="noStrike" u="none">
                 <a:solidFill>
                   <a:schemeClr val="accent1"/>
@@ -9920,7 +9920,7 @@
                 <a:tab algn="l" pos="0"/>
               </a:tabLst>
             </a:pPr>
-            <a:fld id="{C9609877-1080-4067-9B30-B463AFAA42DB}" type="slidenum">
+            <a:fld id="{38AD8DF8-6BDE-45BE-BF76-B7343E287D67}" type="slidenum">
               <a:rPr b="1" lang="en-GB" sz="850" strike="noStrike" u="none">
                 <a:solidFill>
                   <a:schemeClr val="accent1"/>
@@ -10221,7 +10221,7 @@
                 <a:tab algn="l" pos="0"/>
               </a:tabLst>
             </a:pPr>
-            <a:fld id="{158B21D3-FD6B-4CBB-885F-98EF242572EA}" type="slidenum">
+            <a:fld id="{48415C98-CC9F-4664-8C5D-E3A667E77D75}" type="slidenum">
               <a:rPr b="1" lang="en-GB" sz="850" strike="noStrike" u="none">
                 <a:solidFill>
                   <a:schemeClr val="accent1"/>
@@ -10577,7 +10577,7 @@
                 <a:tab algn="l" pos="0"/>
               </a:tabLst>
             </a:pPr>
-            <a:fld id="{48A3E516-64CD-4006-9007-9EF46C7AF9FA}" type="slidenum">
+            <a:fld id="{FBFD8B7B-969D-4249-85FE-C11DA70FD4F2}" type="slidenum">
               <a:rPr b="1" lang="en-GB" sz="850" strike="noStrike" u="none">
                 <a:solidFill>
                   <a:schemeClr val="lt1"/>
@@ -11837,7 +11837,7 @@
                 <a:tab algn="l" pos="0"/>
               </a:tabLst>
             </a:pPr>
-            <a:fld id="{4FA17906-CF9E-484E-9105-BA41367A45F2}" type="slidenum">
+            <a:fld id="{88C15F8E-D563-4109-A5BF-DA81A2A123BA}" type="slidenum">
               <a:rPr b="1" lang="en-GB" sz="850" strike="noStrike" u="none">
                 <a:solidFill>
                   <a:schemeClr val="accent1"/>
@@ -12138,7 +12138,7 @@
                 <a:tab algn="l" pos="0"/>
               </a:tabLst>
             </a:pPr>
-            <a:fld id="{086A8593-5500-41F4-97E8-2ED721848F13}" type="slidenum">
+            <a:fld id="{918F3EBA-C33C-441E-9C74-92F1ED779632}" type="slidenum">
               <a:rPr b="1" lang="en-GB" sz="850" strike="noStrike" u="none">
                 <a:solidFill>
                   <a:schemeClr val="accent1"/>
@@ -12439,7 +12439,7 @@
                 <a:tab algn="l" pos="0"/>
               </a:tabLst>
             </a:pPr>
-            <a:fld id="{0DCE7E55-72D7-472D-8E53-FEAC1D9990A8}" type="slidenum">
+            <a:fld id="{EB99AE6A-84D9-4272-BA44-BA51E3F3A75E}" type="slidenum">
               <a:rPr b="1" lang="en-GB" sz="850" strike="noStrike" u="none">
                 <a:solidFill>
                   <a:schemeClr val="accent1"/>
@@ -12740,7 +12740,7 @@
                 <a:tab algn="l" pos="0"/>
               </a:tabLst>
             </a:pPr>
-            <a:fld id="{11196F0A-0841-4FC7-B05E-6EA8F81BDC0F}" type="slidenum">
+            <a:fld id="{1AE61217-3DC3-472C-B4A0-9D72780A3240}" type="slidenum">
               <a:rPr b="1" lang="en-GB" sz="850" strike="noStrike" u="none">
                 <a:solidFill>
                   <a:schemeClr val="accent1"/>
@@ -13041,7 +13041,7 @@
                 <a:tab algn="l" pos="0"/>
               </a:tabLst>
             </a:pPr>
-            <a:fld id="{6F3D1F1E-5EAD-450A-9773-CFB8C4CC8437}" type="slidenum">
+            <a:fld id="{7E8DDE9C-B554-4E30-9E7C-83EAD25DB25C}" type="slidenum">
               <a:rPr b="1" lang="en-GB" sz="850" strike="noStrike" u="none">
                 <a:solidFill>
                   <a:schemeClr val="accent1"/>
@@ -13342,7 +13342,7 @@
                 <a:tab algn="l" pos="0"/>
               </a:tabLst>
             </a:pPr>
-            <a:fld id="{5CCB86F4-2698-491C-ACDF-B2A2E6D3B96C}" type="slidenum">
+            <a:fld id="{E21DCF5B-F7F2-45B6-93C8-5A078BEB7D69}" type="slidenum">
               <a:rPr b="1" lang="en-GB" sz="850" strike="noStrike" u="none">
                 <a:solidFill>
                   <a:schemeClr val="accent1"/>
@@ -13643,7 +13643,7 @@
                 <a:tab algn="l" pos="0"/>
               </a:tabLst>
             </a:pPr>
-            <a:fld id="{5C994489-C8D6-4FC5-A24B-DC7FE485D512}" type="slidenum">
+            <a:fld id="{6A8740E8-0D50-4198-A8FC-8157D574FFFC}" type="slidenum">
               <a:rPr b="1" lang="en-GB" sz="850" strike="noStrike" u="none">
                 <a:solidFill>
                   <a:schemeClr val="accent1"/>
@@ -13944,7 +13944,7 @@
                 <a:tab algn="l" pos="0"/>
               </a:tabLst>
             </a:pPr>
-            <a:fld id="{940EAA94-B7DE-4D9C-9848-50FC30DBB26A}" type="slidenum">
+            <a:fld id="{1CEEDCA1-3E1C-47B9-A73F-525AC9FDC7B0}" type="slidenum">
               <a:rPr b="1" lang="en-GB" sz="850" strike="noStrike" u="none">
                 <a:solidFill>
                   <a:schemeClr val="accent1"/>
@@ -14245,7 +14245,7 @@
                 <a:tab algn="l" pos="0"/>
               </a:tabLst>
             </a:pPr>
-            <a:fld id="{0EBB506F-7591-42E1-AD64-C9C902C78577}" type="slidenum">
+            <a:fld id="{30D53312-1438-453B-A350-663F29662523}" type="slidenum">
               <a:rPr b="1" lang="en-GB" sz="850" strike="noStrike" u="none">
                 <a:solidFill>
                   <a:schemeClr val="accent1"/>
@@ -14546,7 +14546,7 @@
                 <a:tab algn="l" pos="0"/>
               </a:tabLst>
             </a:pPr>
-            <a:fld id="{EE67A70B-1F7A-4571-92B7-EA6D2EB86EF0}" type="slidenum">
+            <a:fld id="{E20809E3-99E8-49F6-BE4D-2C727CD67E52}" type="slidenum">
               <a:rPr b="1" lang="en-GB" sz="850" strike="noStrike" u="none">
                 <a:solidFill>
                   <a:schemeClr val="accent1"/>
@@ -14847,7 +14847,7 @@
                 <a:tab algn="l" pos="0"/>
               </a:tabLst>
             </a:pPr>
-            <a:fld id="{EF27649E-292A-411C-8F4A-E75A14225B6B}" type="slidenum">
+            <a:fld id="{5015BDBA-BCBD-4D90-81C0-A43AD55D998E}" type="slidenum">
               <a:rPr b="1" lang="en-GB" sz="850" strike="noStrike" u="none">
                 <a:solidFill>
                   <a:schemeClr val="accent1"/>
@@ -16107,7 +16107,7 @@
                 <a:tab algn="l" pos="0"/>
               </a:tabLst>
             </a:pPr>
-            <a:fld id="{1DCB9B19-BC04-44D4-BC2E-A4C57E4B1DA7}" type="slidenum">
+            <a:fld id="{95274355-DD2A-4A3F-A652-4EAF3C1B9593}" type="slidenum">
               <a:rPr b="1" lang="en-GB" sz="850" strike="noStrike" u="none">
                 <a:solidFill>
                   <a:schemeClr val="accent1"/>
@@ -16408,7 +16408,7 @@
                 <a:tab algn="l" pos="0"/>
               </a:tabLst>
             </a:pPr>
-            <a:fld id="{100ECD4B-021C-478F-9E85-460BF013E277}" type="slidenum">
+            <a:fld id="{3D9A64DD-204F-41B4-9B1A-41A94452BB24}" type="slidenum">
               <a:rPr b="1" lang="en-GB" sz="850" strike="noStrike" u="none">
                 <a:solidFill>
                   <a:schemeClr val="accent1"/>
@@ -16709,7 +16709,7 @@
                 <a:tab algn="l" pos="0"/>
               </a:tabLst>
             </a:pPr>
-            <a:fld id="{587F1EEE-1E42-4FF5-83CB-7420D82EFAEC}" type="slidenum">
+            <a:fld id="{6E6117A0-FF4E-41FB-A73B-3C3F3F6C8E62}" type="slidenum">
               <a:rPr b="1" lang="en-GB" sz="850" strike="noStrike" u="none">
                 <a:solidFill>
                   <a:schemeClr val="accent1"/>
@@ -17010,7 +17010,7 @@
                 <a:tab algn="l" pos="0"/>
               </a:tabLst>
             </a:pPr>
-            <a:fld id="{60B78B20-7B3B-4868-AD9E-E94451639418}" type="slidenum">
+            <a:fld id="{649F6B8D-2369-479D-99DA-75E524EB6CA9}" type="slidenum">
               <a:rPr b="1" lang="en-GB" sz="850" strike="noStrike" u="none">
                 <a:solidFill>
                   <a:schemeClr val="accent1"/>
@@ -17311,7 +17311,7 @@
                 <a:tab algn="l" pos="0"/>
               </a:tabLst>
             </a:pPr>
-            <a:fld id="{AF33DDF9-6676-4223-9BD1-10DFB84ABBCF}" type="slidenum">
+            <a:fld id="{2AECC9EB-2BDE-42AE-8A92-2FCC9E88F8CA}" type="slidenum">
               <a:rPr b="1" lang="en-GB" sz="850" strike="noStrike" u="none">
                 <a:solidFill>
                   <a:schemeClr val="accent1"/>
@@ -17612,7 +17612,7 @@
                 <a:tab algn="l" pos="0"/>
               </a:tabLst>
             </a:pPr>
-            <a:fld id="{2B459909-91A4-493E-8166-D586EAB8D786}" type="slidenum">
+            <a:fld id="{DA620E43-352B-48D1-BF63-E031CC162B1E}" type="slidenum">
               <a:rPr b="1" lang="en-GB" sz="850" strike="noStrike" u="none">
                 <a:solidFill>
                   <a:schemeClr val="accent1"/>
@@ -17913,7 +17913,7 @@
                 <a:tab algn="l" pos="0"/>
               </a:tabLst>
             </a:pPr>
-            <a:fld id="{616F1B6E-6CA1-43A8-BA3E-AFA4F7F87E7F}" type="slidenum">
+            <a:fld id="{4254333F-2E38-4A8F-B773-F80204CFB239}" type="slidenum">
               <a:rPr b="1" lang="en-GB" sz="850" strike="noStrike" u="none">
                 <a:solidFill>
                   <a:schemeClr val="accent1"/>
@@ -18214,7 +18214,7 @@
                 <a:tab algn="l" pos="0"/>
               </a:tabLst>
             </a:pPr>
-            <a:fld id="{FBB0BF3F-297A-4DB8-A44F-2E828BA4D3FB}" type="slidenum">
+            <a:fld id="{4D0577B9-6D7F-4EEA-AF10-7ACF3EF6D6BC}" type="slidenum">
               <a:rPr b="1" lang="en-GB" sz="850" strike="noStrike" u="none">
                 <a:solidFill>
                   <a:schemeClr val="accent1"/>
@@ -18515,7 +18515,7 @@
                 <a:tab algn="l" pos="0"/>
               </a:tabLst>
             </a:pPr>
-            <a:fld id="{15338854-B265-4A1F-809A-328CF13C1829}" type="slidenum">
+            <a:fld id="{39AAE02F-84B0-4A74-B649-892AF7CA79B9}" type="slidenum">
               <a:rPr b="1" lang="en-GB" sz="850" strike="noStrike" u="none">
                 <a:solidFill>
                   <a:schemeClr val="accent1"/>
@@ -24662,7 +24662,7 @@
                 <a:tab algn="l" pos="0"/>
               </a:tabLst>
             </a:pPr>
-            <a:fld id="{D9DA1EA7-F054-40FC-AAAC-2F36397DD9ED}" type="slidenum">
+            <a:fld id="{3C90659F-FF20-44D7-A091-BF2F86AAEB93}" type="slidenum">
               <a:rPr b="1" lang="en-GB" sz="850" strike="noStrike" u="none">
                 <a:solidFill>
                   <a:schemeClr val="accent1"/>
@@ -28799,7 +28799,7 @@
                 <a:tab algn="l" pos="0"/>
               </a:tabLst>
             </a:pPr>
-            <a:fld id="{CB23C69C-FE1A-4D54-AC54-B3312558B198}" type="slidenum">
+            <a:fld id="{8C4B760D-5B02-475D-9AF0-871E3C76DB5A}" type="slidenum">
               <a:rPr b="1" lang="en-GB" sz="850" strike="noStrike" u="none">
                 <a:solidFill>
                   <a:schemeClr val="accent1"/>
@@ -29100,7 +29100,7 @@
                 <a:tab algn="l" pos="0"/>
               </a:tabLst>
             </a:pPr>
-            <a:fld id="{42B769FA-D84A-4ABF-A18A-D8513667D4A2}" type="slidenum">
+            <a:fld id="{F75CA17A-E735-4390-A440-041AB1313317}" type="slidenum">
               <a:rPr b="1" lang="en-GB" sz="850" strike="noStrike" u="none">
                 <a:solidFill>
                   <a:schemeClr val="accent1"/>
@@ -29401,7 +29401,7 @@
                 <a:tab algn="l" pos="0"/>
               </a:tabLst>
             </a:pPr>
-            <a:fld id="{2BF690A3-BFBA-4C02-B57A-03F5DDEE4A11}" type="slidenum">
+            <a:fld id="{26B14012-866B-43BD-898C-8495792E786A}" type="slidenum">
               <a:rPr b="1" lang="en-GB" sz="850" strike="noStrike" u="none">
                 <a:solidFill>
                   <a:schemeClr val="accent1"/>
@@ -29702,7 +29702,7 @@
                 <a:tab algn="l" pos="0"/>
               </a:tabLst>
             </a:pPr>
-            <a:fld id="{2E8DE243-4639-4EC4-90AA-64EF0736AF28}" type="slidenum">
+            <a:fld id="{6DB5353C-8486-47B4-A008-111ED3ADA197}" type="slidenum">
               <a:rPr b="1" lang="en-GB" sz="850" strike="noStrike" u="none">
                 <a:solidFill>
                   <a:schemeClr val="accent1"/>
@@ -30003,7 +30003,7 @@
                 <a:tab algn="l" pos="0"/>
               </a:tabLst>
             </a:pPr>
-            <a:fld id="{BC274EB2-B7A4-4F52-AF65-AEF036075D3C}" type="slidenum">
+            <a:fld id="{399828D1-6E7B-41A9-8951-61F4752DD936}" type="slidenum">
               <a:rPr b="1" lang="en-GB" sz="850" strike="noStrike" u="none">
                 <a:solidFill>
                   <a:schemeClr val="accent1"/>
@@ -30304,7 +30304,7 @@
                 <a:tab algn="l" pos="0"/>
               </a:tabLst>
             </a:pPr>
-            <a:fld id="{92A80923-59A5-46EC-9C50-77BDEE07CF93}" type="slidenum">
+            <a:fld id="{188C26A9-528F-4FF3-AE2E-DC9B7787F9E7}" type="slidenum">
               <a:rPr b="1" lang="en-GB" sz="850" strike="noStrike" u="none">
                 <a:solidFill>
                   <a:schemeClr val="accent1"/>
@@ -30605,7 +30605,7 @@
                 <a:tab algn="l" pos="0"/>
               </a:tabLst>
             </a:pPr>
-            <a:fld id="{1951957D-B722-49A1-BEB1-5ECC237CFC0C}" type="slidenum">
+            <a:fld id="{A3C7D1C6-D92B-421A-9D63-D7F22D8C79E4}" type="slidenum">
               <a:rPr b="1" lang="en-GB" sz="850" strike="noStrike" u="none">
                 <a:solidFill>
                   <a:schemeClr val="accent1"/>
@@ -30906,7 +30906,7 @@
                 <a:tab algn="l" pos="0"/>
               </a:tabLst>
             </a:pPr>
-            <a:fld id="{9B44F8BE-3FBE-4758-AB80-81FAEFB61BEB}" type="slidenum">
+            <a:fld id="{05987C19-2632-4B5C-87D4-DDE2229170E8}" type="slidenum">
               <a:rPr b="1" lang="en-GB" sz="850" strike="noStrike" u="none">
                 <a:solidFill>
                   <a:schemeClr val="accent1"/>
@@ -31207,7 +31207,7 @@
                 <a:tab algn="l" pos="0"/>
               </a:tabLst>
             </a:pPr>
-            <a:fld id="{A34278F7-7945-44E5-9665-B707AA4E084C}" type="slidenum">
+            <a:fld id="{52FDE6A8-1598-4E27-A771-057213E360D3}" type="slidenum">
               <a:rPr b="1" lang="en-GB" sz="850" strike="noStrike" u="none">
                 <a:solidFill>
                   <a:schemeClr val="accent1"/>
@@ -31508,7 +31508,7 @@
                 <a:tab algn="l" pos="0"/>
               </a:tabLst>
             </a:pPr>
-            <a:fld id="{8428BBBB-4CA9-4B3C-992C-25FE990EDA47}" type="slidenum">
+            <a:fld id="{736894DC-F566-4138-B62D-9565B8436F5A}" type="slidenum">
               <a:rPr b="1" lang="en-GB" sz="850" strike="noStrike" u="none">
                 <a:solidFill>
                   <a:schemeClr val="accent1"/>
@@ -31864,7 +31864,7 @@
                 <a:tab algn="l" pos="0"/>
               </a:tabLst>
             </a:pPr>
-            <a:fld id="{6E13487E-4BE8-4AE1-9781-4F16893D7B95}" type="slidenum">
+            <a:fld id="{97B22239-F305-461F-832C-A0C0C1B6C65F}" type="slidenum">
               <a:rPr b="1" lang="en-GB" sz="850" strike="noStrike" u="none">
                 <a:solidFill>
                   <a:schemeClr val="lt1"/>
@@ -34663,7 +34663,7 @@
                 <a:tab algn="l" pos="0"/>
               </a:tabLst>
             </a:pPr>
-            <a:fld id="{3B542A23-9582-42A6-A56E-525FB2A50605}" type="slidenum">
+            <a:fld id="{375EB6C3-E66A-45FB-8D2E-B460DE743029}" type="slidenum">
               <a:rPr b="1" lang="en-GB" sz="850" strike="noStrike" u="none">
                 <a:solidFill>
                   <a:schemeClr val="accent1"/>
@@ -34964,7 +34964,7 @@
                 <a:tab algn="l" pos="0"/>
               </a:tabLst>
             </a:pPr>
-            <a:fld id="{13F5BEF4-59E6-45CA-BD05-D6579FBA22E0}" type="slidenum">
+            <a:fld id="{ED7D1F83-ADF7-4A58-BE37-DABF55BEA69F}" type="slidenum">
               <a:rPr b="1" lang="en-GB" sz="850" strike="noStrike" u="none">
                 <a:solidFill>
                   <a:schemeClr val="accent1"/>
@@ -35265,7 +35265,7 @@
                 <a:tab algn="l" pos="0"/>
               </a:tabLst>
             </a:pPr>
-            <a:fld id="{342B472D-D07F-4CAF-9215-3238B179C3E3}" type="slidenum">
+            <a:fld id="{317D8F84-E8BB-4982-95C6-1243FF1A65BE}" type="slidenum">
               <a:rPr b="1" lang="en-GB" sz="850" strike="noStrike" u="none">
                 <a:solidFill>
                   <a:schemeClr val="accent1"/>
@@ -37796,7 +37796,7 @@
         </p:blipFill>
         <p:spPr>
           <a:xfrm>
-            <a:off x="4254840" y="2851560"/>
+            <a:off x="4254840" y="3026160"/>
             <a:ext cx="745560" cy="270000"/>
           </a:xfrm>
           <a:prstGeom prst="rect">
@@ -37971,7 +37971,7 @@
         <p:spPr>
           <a:xfrm>
             <a:off x="684000" y="2700000"/>
-            <a:ext cx="6707880" cy="1078560"/>
+            <a:ext cx="6707880" cy="3782160"/>
           </a:xfrm>
           <a:prstGeom prst="rect">
             <a:avLst/>
@@ -38061,6 +38061,23 @@
                 <a:tab algn="l" pos="0"/>
               </a:tabLst>
             </a:pPr>
+            <a:endParaRPr b="0" lang="en-GB" sz="1200" strike="noStrike" u="none">
+              <a:solidFill>
+                <a:srgbClr val="000000"/>
+              </a:solidFill>
+              <a:uFillTx/>
+              <a:latin typeface="Arial"/>
+            </a:endParaRPr>
+          </a:p>
+          <a:p>
+            <a:pPr defTabSz="685800">
+              <a:lnSpc>
+                <a:spcPct val="105000"/>
+              </a:lnSpc>
+              <a:tabLst>
+                <a:tab algn="l" pos="0"/>
+              </a:tabLst>
+            </a:pPr>
             <a:r>
               <a:rPr b="0" lang="en-US" sz="1200" strike="noStrike" u="none">
                 <a:solidFill>
@@ -38100,6 +38117,23 @@
                 <a:tab algn="l" pos="0"/>
               </a:tabLst>
             </a:pPr>
+            <a:endParaRPr b="0" lang="en-GB" sz="1200" strike="noStrike" u="none">
+              <a:solidFill>
+                <a:srgbClr val="000000"/>
+              </a:solidFill>
+              <a:uFillTx/>
+              <a:latin typeface="Arial"/>
+            </a:endParaRPr>
+          </a:p>
+          <a:p>
+            <a:pPr defTabSz="685800">
+              <a:lnSpc>
+                <a:spcPct val="105000"/>
+              </a:lnSpc>
+              <a:tabLst>
+                <a:tab algn="l" pos="0"/>
+              </a:tabLst>
+            </a:pPr>
             <a:r>
               <a:rPr b="0" lang="en-US" sz="1200" strike="noStrike" u="none">
                 <a:solidFill>
@@ -38122,6 +38156,23 @@
               </a:rPr>
               <a:t>- To convert this to a Green’s function problem, we set</a:t>
             </a:r>
+            <a:endParaRPr b="0" lang="en-GB" sz="1200" strike="noStrike" u="none">
+              <a:solidFill>
+                <a:srgbClr val="000000"/>
+              </a:solidFill>
+              <a:uFillTx/>
+              <a:latin typeface="Arial"/>
+            </a:endParaRPr>
+          </a:p>
+          <a:p>
+            <a:pPr defTabSz="685800">
+              <a:lnSpc>
+                <a:spcPct val="105000"/>
+              </a:lnSpc>
+              <a:tabLst>
+                <a:tab algn="l" pos="0"/>
+              </a:tabLst>
+            </a:pPr>
             <a:endParaRPr b="0" lang="en-GB" sz="1200" strike="noStrike" u="none">
               <a:solidFill>
                 <a:srgbClr val="000000"/>
@@ -38189,6 +38240,34 @@
               </a:rPr>
               <a:t> </a:t>
             </a:r>
+            <a:endParaRPr b="0" lang="en-GB" sz="1200" strike="noStrike" u="none">
+              <a:solidFill>
+                <a:srgbClr val="000000"/>
+              </a:solidFill>
+              <a:uFillTx/>
+              <a:latin typeface="Arial"/>
+            </a:endParaRPr>
+          </a:p>
+          <a:p>
+            <a:pPr defTabSz="685800">
+              <a:lnSpc>
+                <a:spcPct val="105000"/>
+              </a:lnSpc>
+              <a:tabLst>
+                <a:tab algn="l" pos="0"/>
+              </a:tabLst>
+            </a:pPr>
+            <a:r>
+              <a:rPr b="0" lang="en-US" sz="1200" strike="noStrike" u="none">
+                <a:solidFill>
+                  <a:schemeClr val="accent1"/>
+                </a:solidFill>
+                <a:uFillTx/>
+                <a:latin typeface="Imperial Sans Text Medium"/>
+                <a:ea typeface="Inter Medium"/>
+              </a:rPr>
+              <a:t> </a:t>
+            </a:r>
             <a:r>
               <a:rPr b="0" lang="en-US" sz="1200" strike="noStrike" u="none">
                 <a:solidFill>
@@ -38250,6 +38329,23 @@
                 <a:tab algn="l" pos="0"/>
               </a:tabLst>
             </a:pPr>
+            <a:endParaRPr b="0" lang="en-GB" sz="1200" strike="noStrike" u="none">
+              <a:solidFill>
+                <a:srgbClr val="000000"/>
+              </a:solidFill>
+              <a:uFillTx/>
+              <a:latin typeface="Arial"/>
+            </a:endParaRPr>
+          </a:p>
+          <a:p>
+            <a:pPr defTabSz="685800">
+              <a:lnSpc>
+                <a:spcPct val="105000"/>
+              </a:lnSpc>
+              <a:tabLst>
+                <a:tab algn="l" pos="0"/>
+              </a:tabLst>
+            </a:pPr>
             <a:r>
               <a:rPr b="0" lang="en-US" sz="1200" strike="noStrike" u="none">
                 <a:solidFill>
@@ -38272,6 +38368,23 @@
               </a:rPr>
               <a:t>- We also know the jump discontinuity is 1, and that the function must be continuous at y</a:t>
             </a:r>
+            <a:endParaRPr b="0" lang="en-GB" sz="1200" strike="noStrike" u="none">
+              <a:solidFill>
+                <a:srgbClr val="000000"/>
+              </a:solidFill>
+              <a:uFillTx/>
+              <a:latin typeface="Arial"/>
+            </a:endParaRPr>
+          </a:p>
+          <a:p>
+            <a:pPr defTabSz="685800">
+              <a:lnSpc>
+                <a:spcPct val="105000"/>
+              </a:lnSpc>
+              <a:tabLst>
+                <a:tab algn="l" pos="0"/>
+              </a:tabLst>
+            </a:pPr>
             <a:endParaRPr b="0" lang="en-GB" sz="1200" strike="noStrike" u="none">
               <a:solidFill>
                 <a:srgbClr val="000000"/>
@@ -38457,7 +38570,7 @@
         </p:blipFill>
         <p:spPr>
           <a:xfrm>
-            <a:off x="4393080" y="3086640"/>
+            <a:off x="4445640" y="3467520"/>
             <a:ext cx="1161720" cy="222120"/>
           </a:xfrm>
           <a:prstGeom prst="rect">
@@ -38481,7 +38594,7 @@
         </p:blipFill>
         <p:spPr>
           <a:xfrm>
-            <a:off x="6367320" y="3280320"/>
+            <a:off x="6361920" y="3846600"/>
             <a:ext cx="1556640" cy="218520"/>
           </a:xfrm>
           <a:prstGeom prst="rect">
@@ -38505,7 +38618,7 @@
         </p:blipFill>
         <p:spPr>
           <a:xfrm>
-            <a:off x="822600" y="4301640"/>
+            <a:off x="790920" y="5681520"/>
             <a:ext cx="2940840" cy="711360"/>
           </a:xfrm>
           <a:prstGeom prst="rect">

</xml_diff>

<commit_message>
commitment to the git
</commit_message>
<xml_diff>
--- a/M2R_presentation.pptx
+++ b/M2R_presentation.pptx
@@ -153,7 +153,7 @@
         <p:txBody>
           <a:bodyPr/>
           <a:p>
-            <a:fld id="{885C7E0D-7BE0-489F-98AA-B34C4BB0EAD2}" type="slidenum">
+            <a:fld id="{2E19300D-C423-40AC-89DE-1F5E3C537FEF}" type="slidenum">
               <a:t>&lt;#&gt;</a:t>
             </a:fld>
           </a:p>
@@ -236,7 +236,7 @@
         <p:txBody>
           <a:bodyPr/>
           <a:p>
-            <a:fld id="{FD096149-F047-4049-95DD-B4F3E336CD67}" type="slidenum">
+            <a:fld id="{6DA00A81-3464-4EAB-AE83-5FAA5F315FA5}" type="slidenum">
               <a:t>&lt;#&gt;</a:t>
             </a:fld>
           </a:p>
@@ -341,7 +341,7 @@
         <p:txBody>
           <a:bodyPr/>
           <a:p>
-            <a:fld id="{49D21FEC-555D-4E98-B879-60321BE3D03E}" type="slidenum">
+            <a:fld id="{72C3C1C6-808D-4E0A-AEEC-4E1AB5DDEE8B}" type="slidenum">
               <a:t>&lt;#&gt;</a:t>
             </a:fld>
           </a:p>
@@ -424,7 +424,7 @@
         <p:txBody>
           <a:bodyPr/>
           <a:p>
-            <a:fld id="{9A30E294-B0CB-40FE-82BA-0C3F64F106B2}" type="slidenum">
+            <a:fld id="{5D27D0CD-DD90-4AAA-A315-2EDCFD58E94C}" type="slidenum">
               <a:t>&lt;#&gt;</a:t>
             </a:fld>
           </a:p>
@@ -507,7 +507,7 @@
         <p:txBody>
           <a:bodyPr/>
           <a:p>
-            <a:fld id="{928A159A-A088-419A-A294-0A8340D4021C}" type="slidenum">
+            <a:fld id="{15F6683C-ED9D-494F-8528-3AC80A0E15F8}" type="slidenum">
               <a:t>&lt;#&gt;</a:t>
             </a:fld>
           </a:p>
@@ -590,7 +590,7 @@
         <p:txBody>
           <a:bodyPr/>
           <a:p>
-            <a:fld id="{60C5D14A-3F97-49C1-B156-2272CE8D27F2}" type="slidenum">
+            <a:fld id="{3C4B9D83-FE8E-44F1-863C-01FCAF4F843A}" type="slidenum">
               <a:t>&lt;#&gt;</a:t>
             </a:fld>
           </a:p>
@@ -673,7 +673,7 @@
         <p:txBody>
           <a:bodyPr/>
           <a:p>
-            <a:fld id="{1985DDCF-4805-4172-B520-ABA58F5902AB}" type="slidenum">
+            <a:fld id="{AEDBF371-E069-4634-9674-0026273EDC9B}" type="slidenum">
               <a:t>&lt;#&gt;</a:t>
             </a:fld>
           </a:p>
@@ -756,7 +756,7 @@
         <p:txBody>
           <a:bodyPr/>
           <a:p>
-            <a:fld id="{9589E9EC-39EA-4113-9F04-84252D2520B1}" type="slidenum">
+            <a:fld id="{6441BD38-1FB5-4F9F-B576-2A3B75F575F8}" type="slidenum">
               <a:t>&lt;#&gt;</a:t>
             </a:fld>
           </a:p>
@@ -839,7 +839,7 @@
         <p:txBody>
           <a:bodyPr/>
           <a:p>
-            <a:fld id="{EC9D7F19-F05F-4A62-84B7-D39A2E1E5A06}" type="slidenum">
+            <a:fld id="{1E02C4E0-51D6-4ADC-B916-0F88A0944333}" type="slidenum">
               <a:t>&lt;#&gt;</a:t>
             </a:fld>
           </a:p>
@@ -922,7 +922,7 @@
         <p:txBody>
           <a:bodyPr/>
           <a:p>
-            <a:fld id="{A2420554-8677-4E1E-8409-E17584BB1952}" type="slidenum">
+            <a:fld id="{64153A39-DD7E-4CB4-A5AC-39E1680EBEFF}" type="slidenum">
               <a:t>&lt;#&gt;</a:t>
             </a:fld>
           </a:p>
@@ -1005,7 +1005,7 @@
         <p:txBody>
           <a:bodyPr/>
           <a:p>
-            <a:fld id="{409C72BA-7F84-430B-BB70-FCD2A4B6C681}" type="slidenum">
+            <a:fld id="{A1E4AFE3-B726-4167-841B-1D5ED8CED420}" type="slidenum">
               <a:t>&lt;#&gt;</a:t>
             </a:fld>
           </a:p>
@@ -1088,7 +1088,7 @@
         <p:txBody>
           <a:bodyPr/>
           <a:p>
-            <a:fld id="{429F4A77-701C-4209-B158-E55FCD7377DA}" type="slidenum">
+            <a:fld id="{1E2A8D67-1A04-43C3-B30B-C98B242D3D9B}" type="slidenum">
               <a:t>&lt;#&gt;</a:t>
             </a:fld>
           </a:p>
@@ -1171,7 +1171,7 @@
         <p:txBody>
           <a:bodyPr/>
           <a:p>
-            <a:fld id="{9E96C608-0818-446A-B01F-5D1A2DA49FDF}" type="slidenum">
+            <a:fld id="{74531EB7-E541-4CE1-A03B-7705CD71801A}" type="slidenum">
               <a:t>&lt;#&gt;</a:t>
             </a:fld>
           </a:p>
@@ -1276,7 +1276,7 @@
         <p:txBody>
           <a:bodyPr/>
           <a:p>
-            <a:fld id="{66F64B84-080D-41B4-A523-21DCB04907D1}" type="slidenum">
+            <a:fld id="{320201FE-DAEA-4206-B3F8-E6BC122638C7}" type="slidenum">
               <a:t>&lt;#&gt;</a:t>
             </a:fld>
           </a:p>
@@ -1359,7 +1359,7 @@
         <p:txBody>
           <a:bodyPr/>
           <a:p>
-            <a:fld id="{841D60F4-1E7E-4869-9D68-D9A57ECA45BA}" type="slidenum">
+            <a:fld id="{E9451AFF-746E-444E-9FAF-8312FA5BE870}" type="slidenum">
               <a:t>&lt;#&gt;</a:t>
             </a:fld>
           </a:p>
@@ -1442,7 +1442,7 @@
         <p:txBody>
           <a:bodyPr/>
           <a:p>
-            <a:fld id="{64B79B90-C77E-4780-BEFF-BBCE63DD49E4}" type="slidenum">
+            <a:fld id="{0ABC782C-4739-4F4C-B45E-BF7DA1A5E347}" type="slidenum">
               <a:t>&lt;#&gt;</a:t>
             </a:fld>
           </a:p>
@@ -1525,7 +1525,7 @@
         <p:txBody>
           <a:bodyPr/>
           <a:p>
-            <a:fld id="{BCE908AB-B4AB-4AFF-BF6B-60E3AA43CE6B}" type="slidenum">
+            <a:fld id="{FD8FB208-1C3C-4492-94BD-AD366D00A123}" type="slidenum">
               <a:t>&lt;#&gt;</a:t>
             </a:fld>
           </a:p>
@@ -1608,7 +1608,7 @@
         <p:txBody>
           <a:bodyPr/>
           <a:p>
-            <a:fld id="{23FA8F53-0868-42F6-93E2-F2F8286D659F}" type="slidenum">
+            <a:fld id="{51D49B74-D083-4EE9-8CA8-25721A263C43}" type="slidenum">
               <a:t>&lt;#&gt;</a:t>
             </a:fld>
           </a:p>
@@ -1691,7 +1691,7 @@
         <p:txBody>
           <a:bodyPr/>
           <a:p>
-            <a:fld id="{E1DB3FA0-2C93-417F-B5DB-F4C85F3D0B57}" type="slidenum">
+            <a:fld id="{6755C589-12D5-45AE-9918-EE23667F1954}" type="slidenum">
               <a:t>&lt;#&gt;</a:t>
             </a:fld>
           </a:p>
@@ -1774,7 +1774,7 @@
         <p:txBody>
           <a:bodyPr/>
           <a:p>
-            <a:fld id="{4C4B61F2-AE6C-41AD-A023-E60098EF25D8}" type="slidenum">
+            <a:fld id="{D77DED22-348B-44A0-B052-F39CE227271A}" type="slidenum">
               <a:t>&lt;#&gt;</a:t>
             </a:fld>
           </a:p>
@@ -1857,7 +1857,7 @@
         <p:txBody>
           <a:bodyPr/>
           <a:p>
-            <a:fld id="{C5E82138-F722-4ACD-8AA8-C9C6E246AB91}" type="slidenum">
+            <a:fld id="{820E1653-20D3-47F1-BCFE-9CDDAB07D9FD}" type="slidenum">
               <a:t>&lt;#&gt;</a:t>
             </a:fld>
           </a:p>
@@ -1940,7 +1940,7 @@
         <p:txBody>
           <a:bodyPr/>
           <a:p>
-            <a:fld id="{2E53D114-FBC5-46FD-BE3A-768020E993CC}" type="slidenum">
+            <a:fld id="{79E9D6B4-FB9F-4A7D-BC49-ACF6F6AA5906}" type="slidenum">
               <a:t>&lt;#&gt;</a:t>
             </a:fld>
           </a:p>
@@ -2023,7 +2023,7 @@
         <p:txBody>
           <a:bodyPr/>
           <a:p>
-            <a:fld id="{84BC0300-BD19-468A-9616-E42EC1D1FCF3}" type="slidenum">
+            <a:fld id="{7738E507-702A-4436-B3C8-F0013392AF3C}" type="slidenum">
               <a:t>&lt;#&gt;</a:t>
             </a:fld>
           </a:p>
@@ -2106,7 +2106,7 @@
         <p:txBody>
           <a:bodyPr/>
           <a:p>
-            <a:fld id="{F5B48108-8BFE-4E79-B0D6-7E7F1752BCB1}" type="slidenum">
+            <a:fld id="{3CE37BB4-73C0-447C-BC97-443F40E3F8DC}" type="slidenum">
               <a:t>&lt;#&gt;</a:t>
             </a:fld>
           </a:p>
@@ -2211,7 +2211,7 @@
         <p:txBody>
           <a:bodyPr/>
           <a:p>
-            <a:fld id="{3E88D950-5711-45FE-AD8E-5E63E8F931D6}" type="slidenum">
+            <a:fld id="{1C5F7FD2-191D-4C3D-84CC-4119BE2C8CB2}" type="slidenum">
               <a:t>&lt;#&gt;</a:t>
             </a:fld>
           </a:p>
@@ -2294,7 +2294,7 @@
         <p:txBody>
           <a:bodyPr/>
           <a:p>
-            <a:fld id="{CD1DA935-EE78-4ECF-8ED0-C4B37542E5EA}" type="slidenum">
+            <a:fld id="{CFE8E3CF-12E2-4D57-AAEF-083ACE8D3BB7}" type="slidenum">
               <a:t>&lt;#&gt;</a:t>
             </a:fld>
           </a:p>
@@ -2377,7 +2377,7 @@
         <p:txBody>
           <a:bodyPr/>
           <a:p>
-            <a:fld id="{C7B3F08B-8459-490D-A09D-7CD1F5043F68}" type="slidenum">
+            <a:fld id="{7EFAC573-79F0-4F4A-B331-E3BE1066F197}" type="slidenum">
               <a:t>&lt;#&gt;</a:t>
             </a:fld>
           </a:p>
@@ -2460,7 +2460,7 @@
         <p:txBody>
           <a:bodyPr/>
           <a:p>
-            <a:fld id="{ACAEAE2E-B685-4A5D-A3E7-8577C19E5A84}" type="slidenum">
+            <a:fld id="{A737A289-9461-4BF8-A89C-1CC0E3134E6F}" type="slidenum">
               <a:t>&lt;#&gt;</a:t>
             </a:fld>
           </a:p>
@@ -2543,7 +2543,7 @@
         <p:txBody>
           <a:bodyPr/>
           <a:p>
-            <a:fld id="{58BA216A-0AD3-4683-8BDF-ED4F33710E4B}" type="slidenum">
+            <a:fld id="{A900256E-D9BE-4B9A-B349-839E1BAD8E9B}" type="slidenum">
               <a:t>&lt;#&gt;</a:t>
             </a:fld>
           </a:p>
@@ -2626,7 +2626,7 @@
         <p:txBody>
           <a:bodyPr/>
           <a:p>
-            <a:fld id="{F8EBC350-E3BF-4125-AEA9-16F6C7F35F0D}" type="slidenum">
+            <a:fld id="{10797DDB-F560-4A07-A848-26FE6F0F5B02}" type="slidenum">
               <a:t>&lt;#&gt;</a:t>
             </a:fld>
           </a:p>
@@ -2709,7 +2709,7 @@
         <p:txBody>
           <a:bodyPr/>
           <a:p>
-            <a:fld id="{B8F40B09-6C0C-4064-B4C3-1C2322685B63}" type="slidenum">
+            <a:fld id="{259F0E7E-AEDB-4F88-BE1C-F21116D9AA61}" type="slidenum">
               <a:t>&lt;#&gt;</a:t>
             </a:fld>
           </a:p>
@@ -2792,7 +2792,7 @@
         <p:txBody>
           <a:bodyPr/>
           <a:p>
-            <a:fld id="{F998FD4F-0F0F-4A48-A78B-D67DE6F94E55}" type="slidenum">
+            <a:fld id="{F66396DF-0488-4E76-A543-6B07CFBD79BF}" type="slidenum">
               <a:t>&lt;#&gt;</a:t>
             </a:fld>
           </a:p>
@@ -2875,7 +2875,7 @@
         <p:txBody>
           <a:bodyPr/>
           <a:p>
-            <a:fld id="{C21253B4-AD1B-43F7-9636-663F41F704C4}" type="slidenum">
+            <a:fld id="{E5C3DECC-328C-4667-AAE0-64CF3992BACC}" type="slidenum">
               <a:t>&lt;#&gt;</a:t>
             </a:fld>
           </a:p>
@@ -3112,7 +3112,7 @@
         <p:txBody>
           <a:bodyPr/>
           <a:p>
-            <a:fld id="{1E1305F1-6576-4EF2-A641-1DCD4C3E441A}" type="slidenum">
+            <a:fld id="{970453F8-1401-4C86-B3F4-72AB85ADDACA}" type="slidenum">
               <a:t>&lt;#&gt;</a:t>
             </a:fld>
           </a:p>
@@ -3283,7 +3283,7 @@
         <p:txBody>
           <a:bodyPr/>
           <a:p>
-            <a:fld id="{FED06C92-1B8E-461F-AEBB-2CD30A2D8CA8}" type="slidenum">
+            <a:fld id="{9011EE7A-FFEB-460C-813E-E492714EC603}" type="slidenum">
               <a:t>&lt;#&gt;</a:t>
             </a:fld>
           </a:p>
@@ -3366,7 +3366,7 @@
         <p:txBody>
           <a:bodyPr/>
           <a:p>
-            <a:fld id="{AAAC77E2-BD10-4397-BBA8-0992B8B52D95}" type="slidenum">
+            <a:fld id="{723D5F44-E626-4925-9C94-A475AAA0A6F4}" type="slidenum">
               <a:t>&lt;#&gt;</a:t>
             </a:fld>
           </a:p>
@@ -3449,7 +3449,7 @@
         <p:txBody>
           <a:bodyPr/>
           <a:p>
-            <a:fld id="{BA170042-FE13-463D-967B-22F871A59256}" type="slidenum">
+            <a:fld id="{B7FBDB83-5BFB-4705-A844-538A76309D95}" type="slidenum">
               <a:t>&lt;#&gt;</a:t>
             </a:fld>
           </a:p>
@@ -3532,7 +3532,7 @@
         <p:txBody>
           <a:bodyPr/>
           <a:p>
-            <a:fld id="{95793F28-5A07-439E-A6EE-F83C07790822}" type="slidenum">
+            <a:fld id="{63B7A5BB-4359-43CA-84D6-B3A81556F90C}" type="slidenum">
               <a:t>&lt;#&gt;</a:t>
             </a:fld>
           </a:p>
@@ -3615,7 +3615,7 @@
         <p:txBody>
           <a:bodyPr/>
           <a:p>
-            <a:fld id="{21132C84-8B74-4085-9554-C7FA44862303}" type="slidenum">
+            <a:fld id="{E459365B-FFCF-42EB-A1FB-3DFEA1534C94}" type="slidenum">
               <a:t>&lt;#&gt;</a:t>
             </a:fld>
           </a:p>
@@ -3698,7 +3698,7 @@
         <p:txBody>
           <a:bodyPr/>
           <a:p>
-            <a:fld id="{9DCAD386-EF52-4617-8E46-8677DF3C7D60}" type="slidenum">
+            <a:fld id="{C38E87C6-A551-44CC-886B-C101EA4F73BD}" type="slidenum">
               <a:t>&lt;#&gt;</a:t>
             </a:fld>
           </a:p>
@@ -3781,7 +3781,7 @@
         <p:txBody>
           <a:bodyPr/>
           <a:p>
-            <a:fld id="{061F94B8-82D2-4E0F-A9BE-7551FD251149}" type="slidenum">
+            <a:fld id="{CEDA7C4B-7623-429C-8C83-EAD84FB6591E}" type="slidenum">
               <a:t>&lt;#&gt;</a:t>
             </a:fld>
           </a:p>
@@ -3864,7 +3864,7 @@
         <p:txBody>
           <a:bodyPr/>
           <a:p>
-            <a:fld id="{97103A6D-30DA-4101-A3B4-0BE29D40556E}" type="slidenum">
+            <a:fld id="{5F1A9EB8-2420-40B2-907F-C275459D2BE8}" type="slidenum">
               <a:t>&lt;#&gt;</a:t>
             </a:fld>
           </a:p>
@@ -3947,7 +3947,7 @@
         <p:txBody>
           <a:bodyPr/>
           <a:p>
-            <a:fld id="{519BABCE-E077-496A-9D20-BBCDB6D36A57}" type="slidenum">
+            <a:fld id="{8056AEA7-DB84-4750-98D8-9C7311EA5A53}" type="slidenum">
               <a:t>&lt;#&gt;</a:t>
             </a:fld>
           </a:p>
@@ -4030,7 +4030,7 @@
         <p:txBody>
           <a:bodyPr/>
           <a:p>
-            <a:fld id="{1C1E92EC-5D4A-4245-AF14-9DA761ED1E24}" type="slidenum">
+            <a:fld id="{4C327640-0A4B-4DD8-A54A-EC95F4D4A048}" type="slidenum">
               <a:t>&lt;#&gt;</a:t>
             </a:fld>
           </a:p>
@@ -4113,7 +4113,7 @@
         <p:txBody>
           <a:bodyPr/>
           <a:p>
-            <a:fld id="{1965EA46-9F9E-4F7A-AB11-FA44BCE0A59E}" type="slidenum">
+            <a:fld id="{0970EB35-4B4B-4198-9713-120F8C51420C}" type="slidenum">
               <a:t>&lt;#&gt;</a:t>
             </a:fld>
           </a:p>
@@ -4240,7 +4240,7 @@
         <p:txBody>
           <a:bodyPr/>
           <a:p>
-            <a:fld id="{A256C1F6-ADA3-4980-9019-A14D6C5C521A}" type="slidenum">
+            <a:fld id="{79E1D361-5E24-443C-9954-DDFC8FCD1C5E}" type="slidenum">
               <a:t>&lt;#&gt;</a:t>
             </a:fld>
           </a:p>
@@ -4323,7 +4323,7 @@
         <p:txBody>
           <a:bodyPr/>
           <a:p>
-            <a:fld id="{488F50C6-618E-4B51-BC4E-A132EE70B680}" type="slidenum">
+            <a:fld id="{A6CAA4D3-FBCB-4DBE-8CBD-1DB3C357031B}" type="slidenum">
               <a:t>&lt;#&gt;</a:t>
             </a:fld>
           </a:p>
@@ -4406,7 +4406,7 @@
         <p:txBody>
           <a:bodyPr/>
           <a:p>
-            <a:fld id="{33137F86-4A3F-41FE-9278-780348C0D70C}" type="slidenum">
+            <a:fld id="{6972D348-9F43-466E-A8A1-E96187CBEA56}" type="slidenum">
               <a:t>&lt;#&gt;</a:t>
             </a:fld>
           </a:p>
@@ -5896,7 +5896,7 @@
                 <a:tab algn="l" pos="0"/>
               </a:tabLst>
             </a:pPr>
-            <a:fld id="{E0EBFE90-C31B-411E-AB14-1988C8E613F3}" type="slidenum">
+            <a:fld id="{F66A1AE2-B276-4A84-9FFD-288625774228}" type="slidenum">
               <a:rPr b="1" lang="en-GB" sz="850" strike="noStrike" u="none">
                 <a:solidFill>
                   <a:schemeClr val="accent1"/>
@@ -6197,7 +6197,7 @@
                 <a:tab algn="l" pos="0"/>
               </a:tabLst>
             </a:pPr>
-            <a:fld id="{49C6A626-B8B7-4529-88C8-5CD0874043A1}" type="slidenum">
+            <a:fld id="{776D829D-02E9-4FF3-9D12-87724EF93964}" type="slidenum">
               <a:rPr b="1" lang="en-GB" sz="850" strike="noStrike" u="none">
                 <a:solidFill>
                   <a:schemeClr val="accent1"/>
@@ -7457,7 +7457,7 @@
                 <a:tab algn="l" pos="0"/>
               </a:tabLst>
             </a:pPr>
-            <a:fld id="{140E9092-28EC-49AC-81E7-3AF791E657D9}" type="slidenum">
+            <a:fld id="{70A029C3-C35C-44F6-A1B1-130BA91A9AD4}" type="slidenum">
               <a:rPr b="1" lang="en-GB" sz="850" strike="noStrike" u="none">
                 <a:solidFill>
                   <a:schemeClr val="accent1"/>
@@ -7758,7 +7758,7 @@
                 <a:tab algn="l" pos="0"/>
               </a:tabLst>
             </a:pPr>
-            <a:fld id="{C36B9DD7-71C1-4726-9765-31DE436402EB}" type="slidenum">
+            <a:fld id="{737D2D8E-FBC6-40EE-8730-1D4808C98180}" type="slidenum">
               <a:rPr b="1" lang="en-GB" sz="850" strike="noStrike" u="none">
                 <a:solidFill>
                   <a:schemeClr val="accent1"/>
@@ -8059,7 +8059,7 @@
                 <a:tab algn="l" pos="0"/>
               </a:tabLst>
             </a:pPr>
-            <a:fld id="{1FD96505-76EC-4DC6-8C21-3BC56128C77F}" type="slidenum">
+            <a:fld id="{ECC6F61F-CD54-4E8B-89C4-DDFBA7DE1911}" type="slidenum">
               <a:rPr b="1" lang="en-GB" sz="850" strike="noStrike" u="none">
                 <a:solidFill>
                   <a:schemeClr val="accent1"/>
@@ -8360,7 +8360,7 @@
                 <a:tab algn="l" pos="0"/>
               </a:tabLst>
             </a:pPr>
-            <a:fld id="{61504ADB-D565-48C3-A2CD-22B964F90C16}" type="slidenum">
+            <a:fld id="{24929139-34D6-49A3-BC8D-4E1F566B6CF1}" type="slidenum">
               <a:rPr b="1" lang="en-GB" sz="850" strike="noStrike" u="none">
                 <a:solidFill>
                   <a:schemeClr val="accent1"/>
@@ -8661,7 +8661,7 @@
                 <a:tab algn="l" pos="0"/>
               </a:tabLst>
             </a:pPr>
-            <a:fld id="{BE935054-0D81-4F19-BEB8-7A80616E6CF7}" type="slidenum">
+            <a:fld id="{6685164C-0433-4C65-BF47-3DAD3185C648}" type="slidenum">
               <a:rPr b="1" lang="en-GB" sz="850" strike="noStrike" u="none">
                 <a:solidFill>
                   <a:schemeClr val="accent1"/>
@@ -9017,7 +9017,7 @@
                 <a:tab algn="l" pos="0"/>
               </a:tabLst>
             </a:pPr>
-            <a:fld id="{0AA48F52-97B1-46AE-A761-27CD1FCF5D49}" type="slidenum">
+            <a:fld id="{5B8B9650-8C29-4CF1-9581-4E87171B309C}" type="slidenum">
               <a:rPr b="1" lang="en-GB" sz="850" strike="noStrike" u="none">
                 <a:solidFill>
                   <a:schemeClr val="lt1"/>
@@ -9318,7 +9318,7 @@
                 <a:tab algn="l" pos="0"/>
               </a:tabLst>
             </a:pPr>
-            <a:fld id="{ED32148C-19F0-4E8B-856E-8ABA293971A2}" type="slidenum">
+            <a:fld id="{0BCBACE2-5491-40DA-A620-AB7B063D83F1}" type="slidenum">
               <a:rPr b="1" lang="en-GB" sz="850" strike="noStrike" u="none">
                 <a:solidFill>
                   <a:schemeClr val="accent1"/>
@@ -9619,7 +9619,7 @@
                 <a:tab algn="l" pos="0"/>
               </a:tabLst>
             </a:pPr>
-            <a:fld id="{DD8FB0C6-C61C-428F-B312-6737FCE3ADDD}" type="slidenum">
+            <a:fld id="{203E2860-D0D6-4BA8-B128-F10D5036643F}" type="slidenum">
               <a:rPr b="1" lang="en-GB" sz="850" strike="noStrike" u="none">
                 <a:solidFill>
                   <a:schemeClr val="accent1"/>
@@ -9920,7 +9920,7 @@
                 <a:tab algn="l" pos="0"/>
               </a:tabLst>
             </a:pPr>
-            <a:fld id="{38AD8DF8-6BDE-45BE-BF76-B7343E287D67}" type="slidenum">
+            <a:fld id="{457B38CA-3875-44E9-AC01-F277B0BCA4CC}" type="slidenum">
               <a:rPr b="1" lang="en-GB" sz="850" strike="noStrike" u="none">
                 <a:solidFill>
                   <a:schemeClr val="accent1"/>
@@ -10221,7 +10221,7 @@
                 <a:tab algn="l" pos="0"/>
               </a:tabLst>
             </a:pPr>
-            <a:fld id="{48415C98-CC9F-4664-8C5D-E3A667E77D75}" type="slidenum">
+            <a:fld id="{B1E83BD1-49AA-41C9-8FD2-73C16DAB0C84}" type="slidenum">
               <a:rPr b="1" lang="en-GB" sz="850" strike="noStrike" u="none">
                 <a:solidFill>
                   <a:schemeClr val="accent1"/>
@@ -10577,7 +10577,7 @@
                 <a:tab algn="l" pos="0"/>
               </a:tabLst>
             </a:pPr>
-            <a:fld id="{FBFD8B7B-969D-4249-85FE-C11DA70FD4F2}" type="slidenum">
+            <a:fld id="{4BC75949-A51F-43BB-89AE-70CEAC68C03E}" type="slidenum">
               <a:rPr b="1" lang="en-GB" sz="850" strike="noStrike" u="none">
                 <a:solidFill>
                   <a:schemeClr val="lt1"/>
@@ -11837,7 +11837,7 @@
                 <a:tab algn="l" pos="0"/>
               </a:tabLst>
             </a:pPr>
-            <a:fld id="{88C15F8E-D563-4109-A5BF-DA81A2A123BA}" type="slidenum">
+            <a:fld id="{344889D3-DA31-41D7-A3AE-0BA5A8365087}" type="slidenum">
               <a:rPr b="1" lang="en-GB" sz="850" strike="noStrike" u="none">
                 <a:solidFill>
                   <a:schemeClr val="accent1"/>
@@ -12138,7 +12138,7 @@
                 <a:tab algn="l" pos="0"/>
               </a:tabLst>
             </a:pPr>
-            <a:fld id="{918F3EBA-C33C-441E-9C74-92F1ED779632}" type="slidenum">
+            <a:fld id="{46EEB753-F7AF-4912-A1C5-0BF6FFC548E0}" type="slidenum">
               <a:rPr b="1" lang="en-GB" sz="850" strike="noStrike" u="none">
                 <a:solidFill>
                   <a:schemeClr val="accent1"/>
@@ -12439,7 +12439,7 @@
                 <a:tab algn="l" pos="0"/>
               </a:tabLst>
             </a:pPr>
-            <a:fld id="{EB99AE6A-84D9-4272-BA44-BA51E3F3A75E}" type="slidenum">
+            <a:fld id="{C613C6BD-D9B9-4E1B-8AEA-FAF9B13B35A8}" type="slidenum">
               <a:rPr b="1" lang="en-GB" sz="850" strike="noStrike" u="none">
                 <a:solidFill>
                   <a:schemeClr val="accent1"/>
@@ -12740,7 +12740,7 @@
                 <a:tab algn="l" pos="0"/>
               </a:tabLst>
             </a:pPr>
-            <a:fld id="{1AE61217-3DC3-472C-B4A0-9D72780A3240}" type="slidenum">
+            <a:fld id="{A7D479C6-C561-48AA-B886-9A0ACC81832B}" type="slidenum">
               <a:rPr b="1" lang="en-GB" sz="850" strike="noStrike" u="none">
                 <a:solidFill>
                   <a:schemeClr val="accent1"/>
@@ -13041,7 +13041,7 @@
                 <a:tab algn="l" pos="0"/>
               </a:tabLst>
             </a:pPr>
-            <a:fld id="{7E8DDE9C-B554-4E30-9E7C-83EAD25DB25C}" type="slidenum">
+            <a:fld id="{AFAF3802-E9A6-4039-8CEC-A5193EE1E640}" type="slidenum">
               <a:rPr b="1" lang="en-GB" sz="850" strike="noStrike" u="none">
                 <a:solidFill>
                   <a:schemeClr val="accent1"/>
@@ -13342,7 +13342,7 @@
                 <a:tab algn="l" pos="0"/>
               </a:tabLst>
             </a:pPr>
-            <a:fld id="{E21DCF5B-F7F2-45B6-93C8-5A078BEB7D69}" type="slidenum">
+            <a:fld id="{1B612145-140E-4364-9848-587F1971ECBE}" type="slidenum">
               <a:rPr b="1" lang="en-GB" sz="850" strike="noStrike" u="none">
                 <a:solidFill>
                   <a:schemeClr val="accent1"/>
@@ -13643,7 +13643,7 @@
                 <a:tab algn="l" pos="0"/>
               </a:tabLst>
             </a:pPr>
-            <a:fld id="{6A8740E8-0D50-4198-A8FC-8157D574FFFC}" type="slidenum">
+            <a:fld id="{ED2426EF-0830-4C4B-832A-E025DD1A1999}" type="slidenum">
               <a:rPr b="1" lang="en-GB" sz="850" strike="noStrike" u="none">
                 <a:solidFill>
                   <a:schemeClr val="accent1"/>
@@ -13944,7 +13944,7 @@
                 <a:tab algn="l" pos="0"/>
               </a:tabLst>
             </a:pPr>
-            <a:fld id="{1CEEDCA1-3E1C-47B9-A73F-525AC9FDC7B0}" type="slidenum">
+            <a:fld id="{33EAE54C-C89B-4DF4-B4CF-00BA2E0702A4}" type="slidenum">
               <a:rPr b="1" lang="en-GB" sz="850" strike="noStrike" u="none">
                 <a:solidFill>
                   <a:schemeClr val="accent1"/>
@@ -14245,7 +14245,7 @@
                 <a:tab algn="l" pos="0"/>
               </a:tabLst>
             </a:pPr>
-            <a:fld id="{30D53312-1438-453B-A350-663F29662523}" type="slidenum">
+            <a:fld id="{1A502975-83A2-4471-ADCC-244582A71FAD}" type="slidenum">
               <a:rPr b="1" lang="en-GB" sz="850" strike="noStrike" u="none">
                 <a:solidFill>
                   <a:schemeClr val="accent1"/>
@@ -14546,7 +14546,7 @@
                 <a:tab algn="l" pos="0"/>
               </a:tabLst>
             </a:pPr>
-            <a:fld id="{E20809E3-99E8-49F6-BE4D-2C727CD67E52}" type="slidenum">
+            <a:fld id="{F042BC91-4DA7-481D-B347-146FF3313AEC}" type="slidenum">
               <a:rPr b="1" lang="en-GB" sz="850" strike="noStrike" u="none">
                 <a:solidFill>
                   <a:schemeClr val="accent1"/>
@@ -14847,7 +14847,7 @@
                 <a:tab algn="l" pos="0"/>
               </a:tabLst>
             </a:pPr>
-            <a:fld id="{5015BDBA-BCBD-4D90-81C0-A43AD55D998E}" type="slidenum">
+            <a:fld id="{64151383-A371-4BDE-9839-C76581C88311}" type="slidenum">
               <a:rPr b="1" lang="en-GB" sz="850" strike="noStrike" u="none">
                 <a:solidFill>
                   <a:schemeClr val="accent1"/>
@@ -16107,7 +16107,7 @@
                 <a:tab algn="l" pos="0"/>
               </a:tabLst>
             </a:pPr>
-            <a:fld id="{95274355-DD2A-4A3F-A652-4EAF3C1B9593}" type="slidenum">
+            <a:fld id="{64E5A7BA-08B5-436B-BA9B-3EF97BBD5827}" type="slidenum">
               <a:rPr b="1" lang="en-GB" sz="850" strike="noStrike" u="none">
                 <a:solidFill>
                   <a:schemeClr val="accent1"/>
@@ -16408,7 +16408,7 @@
                 <a:tab algn="l" pos="0"/>
               </a:tabLst>
             </a:pPr>
-            <a:fld id="{3D9A64DD-204F-41B4-9B1A-41A94452BB24}" type="slidenum">
+            <a:fld id="{986D3324-174B-4896-B543-54089985E542}" type="slidenum">
               <a:rPr b="1" lang="en-GB" sz="850" strike="noStrike" u="none">
                 <a:solidFill>
                   <a:schemeClr val="accent1"/>
@@ -16709,7 +16709,7 @@
                 <a:tab algn="l" pos="0"/>
               </a:tabLst>
             </a:pPr>
-            <a:fld id="{6E6117A0-FF4E-41FB-A73B-3C3F3F6C8E62}" type="slidenum">
+            <a:fld id="{F1C3DE98-AC28-4C69-8440-EE8E0286683A}" type="slidenum">
               <a:rPr b="1" lang="en-GB" sz="850" strike="noStrike" u="none">
                 <a:solidFill>
                   <a:schemeClr val="accent1"/>
@@ -17010,7 +17010,7 @@
                 <a:tab algn="l" pos="0"/>
               </a:tabLst>
             </a:pPr>
-            <a:fld id="{649F6B8D-2369-479D-99DA-75E524EB6CA9}" type="slidenum">
+            <a:fld id="{D76DB840-2B21-456A-9849-B1AD3D649804}" type="slidenum">
               <a:rPr b="1" lang="en-GB" sz="850" strike="noStrike" u="none">
                 <a:solidFill>
                   <a:schemeClr val="accent1"/>
@@ -17311,7 +17311,7 @@
                 <a:tab algn="l" pos="0"/>
               </a:tabLst>
             </a:pPr>
-            <a:fld id="{2AECC9EB-2BDE-42AE-8A92-2FCC9E88F8CA}" type="slidenum">
+            <a:fld id="{7E6A08A8-16F8-4542-BDED-DA09C5E16D5C}" type="slidenum">
               <a:rPr b="1" lang="en-GB" sz="850" strike="noStrike" u="none">
                 <a:solidFill>
                   <a:schemeClr val="accent1"/>
@@ -17612,7 +17612,7 @@
                 <a:tab algn="l" pos="0"/>
               </a:tabLst>
             </a:pPr>
-            <a:fld id="{DA620E43-352B-48D1-BF63-E031CC162B1E}" type="slidenum">
+            <a:fld id="{93F7E10F-2DF4-4D08-AD90-5E8B8591D775}" type="slidenum">
               <a:rPr b="1" lang="en-GB" sz="850" strike="noStrike" u="none">
                 <a:solidFill>
                   <a:schemeClr val="accent1"/>
@@ -17913,7 +17913,7 @@
                 <a:tab algn="l" pos="0"/>
               </a:tabLst>
             </a:pPr>
-            <a:fld id="{4254333F-2E38-4A8F-B773-F80204CFB239}" type="slidenum">
+            <a:fld id="{47D7DEA8-FB56-407C-BFB5-E6FDE96E0551}" type="slidenum">
               <a:rPr b="1" lang="en-GB" sz="850" strike="noStrike" u="none">
                 <a:solidFill>
                   <a:schemeClr val="accent1"/>
@@ -18214,7 +18214,7 @@
                 <a:tab algn="l" pos="0"/>
               </a:tabLst>
             </a:pPr>
-            <a:fld id="{4D0577B9-6D7F-4EEA-AF10-7ACF3EF6D6BC}" type="slidenum">
+            <a:fld id="{0B5B5248-9914-4726-BD10-A57606A1F8EA}" type="slidenum">
               <a:rPr b="1" lang="en-GB" sz="850" strike="noStrike" u="none">
                 <a:solidFill>
                   <a:schemeClr val="accent1"/>
@@ -18515,7 +18515,7 @@
                 <a:tab algn="l" pos="0"/>
               </a:tabLst>
             </a:pPr>
-            <a:fld id="{39AAE02F-84B0-4A74-B649-892AF7CA79B9}" type="slidenum">
+            <a:fld id="{C893219D-8D11-4181-A5E7-D755A5F02B79}" type="slidenum">
               <a:rPr b="1" lang="en-GB" sz="850" strike="noStrike" u="none">
                 <a:solidFill>
                   <a:schemeClr val="accent1"/>
@@ -24662,7 +24662,7 @@
                 <a:tab algn="l" pos="0"/>
               </a:tabLst>
             </a:pPr>
-            <a:fld id="{3C90659F-FF20-44D7-A091-BF2F86AAEB93}" type="slidenum">
+            <a:fld id="{B7A8097E-5CEC-454B-B483-96B9F3EFC9B8}" type="slidenum">
               <a:rPr b="1" lang="en-GB" sz="850" strike="noStrike" u="none">
                 <a:solidFill>
                   <a:schemeClr val="accent1"/>
@@ -28799,7 +28799,7 @@
                 <a:tab algn="l" pos="0"/>
               </a:tabLst>
             </a:pPr>
-            <a:fld id="{8C4B760D-5B02-475D-9AF0-871E3C76DB5A}" type="slidenum">
+            <a:fld id="{889C7003-836D-43C4-AF68-3FC5A8118908}" type="slidenum">
               <a:rPr b="1" lang="en-GB" sz="850" strike="noStrike" u="none">
                 <a:solidFill>
                   <a:schemeClr val="accent1"/>
@@ -29100,7 +29100,7 @@
                 <a:tab algn="l" pos="0"/>
               </a:tabLst>
             </a:pPr>
-            <a:fld id="{F75CA17A-E735-4390-A440-041AB1313317}" type="slidenum">
+            <a:fld id="{8B36D97A-CA24-46E5-B203-8C18872391E9}" type="slidenum">
               <a:rPr b="1" lang="en-GB" sz="850" strike="noStrike" u="none">
                 <a:solidFill>
                   <a:schemeClr val="accent1"/>
@@ -29401,7 +29401,7 @@
                 <a:tab algn="l" pos="0"/>
               </a:tabLst>
             </a:pPr>
-            <a:fld id="{26B14012-866B-43BD-898C-8495792E786A}" type="slidenum">
+            <a:fld id="{5A8E4C0D-B8E5-42D3-88F7-EF53E0F5542D}" type="slidenum">
               <a:rPr b="1" lang="en-GB" sz="850" strike="noStrike" u="none">
                 <a:solidFill>
                   <a:schemeClr val="accent1"/>
@@ -29702,7 +29702,7 @@
                 <a:tab algn="l" pos="0"/>
               </a:tabLst>
             </a:pPr>
-            <a:fld id="{6DB5353C-8486-47B4-A008-111ED3ADA197}" type="slidenum">
+            <a:fld id="{757CC714-5891-4015-AF9B-A6A38E141409}" type="slidenum">
               <a:rPr b="1" lang="en-GB" sz="850" strike="noStrike" u="none">
                 <a:solidFill>
                   <a:schemeClr val="accent1"/>
@@ -30003,7 +30003,7 @@
                 <a:tab algn="l" pos="0"/>
               </a:tabLst>
             </a:pPr>
-            <a:fld id="{399828D1-6E7B-41A9-8951-61F4752DD936}" type="slidenum">
+            <a:fld id="{31F2BCD5-3533-4952-916D-C7DD1D514B8D}" type="slidenum">
               <a:rPr b="1" lang="en-GB" sz="850" strike="noStrike" u="none">
                 <a:solidFill>
                   <a:schemeClr val="accent1"/>
@@ -30304,7 +30304,7 @@
                 <a:tab algn="l" pos="0"/>
               </a:tabLst>
             </a:pPr>
-            <a:fld id="{188C26A9-528F-4FF3-AE2E-DC9B7787F9E7}" type="slidenum">
+            <a:fld id="{1BA1CB2A-0C5E-4072-9CA4-0838FC80DDF9}" type="slidenum">
               <a:rPr b="1" lang="en-GB" sz="850" strike="noStrike" u="none">
                 <a:solidFill>
                   <a:schemeClr val="accent1"/>
@@ -30605,7 +30605,7 @@
                 <a:tab algn="l" pos="0"/>
               </a:tabLst>
             </a:pPr>
-            <a:fld id="{A3C7D1C6-D92B-421A-9D63-D7F22D8C79E4}" type="slidenum">
+            <a:fld id="{F8BE6382-EE07-4C40-8472-B68C91159D94}" type="slidenum">
               <a:rPr b="1" lang="en-GB" sz="850" strike="noStrike" u="none">
                 <a:solidFill>
                   <a:schemeClr val="accent1"/>
@@ -30906,7 +30906,7 @@
                 <a:tab algn="l" pos="0"/>
               </a:tabLst>
             </a:pPr>
-            <a:fld id="{05987C19-2632-4B5C-87D4-DDE2229170E8}" type="slidenum">
+            <a:fld id="{D9A3848A-B425-4B32-B9B3-8EA83F836E67}" type="slidenum">
               <a:rPr b="1" lang="en-GB" sz="850" strike="noStrike" u="none">
                 <a:solidFill>
                   <a:schemeClr val="accent1"/>
@@ -31207,7 +31207,7 @@
                 <a:tab algn="l" pos="0"/>
               </a:tabLst>
             </a:pPr>
-            <a:fld id="{52FDE6A8-1598-4E27-A771-057213E360D3}" type="slidenum">
+            <a:fld id="{3C4F6FCA-2ACF-409F-92C7-0F51FC9923AF}" type="slidenum">
               <a:rPr b="1" lang="en-GB" sz="850" strike="noStrike" u="none">
                 <a:solidFill>
                   <a:schemeClr val="accent1"/>
@@ -31508,7 +31508,7 @@
                 <a:tab algn="l" pos="0"/>
               </a:tabLst>
             </a:pPr>
-            <a:fld id="{736894DC-F566-4138-B62D-9565B8436F5A}" type="slidenum">
+            <a:fld id="{2643CD8A-E8EB-4C09-BB67-5E8ACD7D8B45}" type="slidenum">
               <a:rPr b="1" lang="en-GB" sz="850" strike="noStrike" u="none">
                 <a:solidFill>
                   <a:schemeClr val="accent1"/>
@@ -31864,7 +31864,7 @@
                 <a:tab algn="l" pos="0"/>
               </a:tabLst>
             </a:pPr>
-            <a:fld id="{97B22239-F305-461F-832C-A0C0C1B6C65F}" type="slidenum">
+            <a:fld id="{983CB6AB-07FB-4F53-A67E-F6B38984574B}" type="slidenum">
               <a:rPr b="1" lang="en-GB" sz="850" strike="noStrike" u="none">
                 <a:solidFill>
                   <a:schemeClr val="lt1"/>
@@ -34663,7 +34663,7 @@
                 <a:tab algn="l" pos="0"/>
               </a:tabLst>
             </a:pPr>
-            <a:fld id="{375EB6C3-E66A-45FB-8D2E-B460DE743029}" type="slidenum">
+            <a:fld id="{1D4D84AB-8BC7-4CEC-B241-DA85469F61DA}" type="slidenum">
               <a:rPr b="1" lang="en-GB" sz="850" strike="noStrike" u="none">
                 <a:solidFill>
                   <a:schemeClr val="accent1"/>
@@ -34964,7 +34964,7 @@
                 <a:tab algn="l" pos="0"/>
               </a:tabLst>
             </a:pPr>
-            <a:fld id="{ED7D1F83-ADF7-4A58-BE37-DABF55BEA69F}" type="slidenum">
+            <a:fld id="{2DBC02F3-772C-4ECF-ABB7-AB1A665754CB}" type="slidenum">
               <a:rPr b="1" lang="en-GB" sz="850" strike="noStrike" u="none">
                 <a:solidFill>
                   <a:schemeClr val="accent1"/>
@@ -35265,7 +35265,7 @@
                 <a:tab algn="l" pos="0"/>
               </a:tabLst>
             </a:pPr>
-            <a:fld id="{317D8F84-E8BB-4982-95C6-1243FF1A65BE}" type="slidenum">
+            <a:fld id="{B024C4B4-088A-433D-BE17-AFE8608A2BA3}" type="slidenum">
               <a:rPr b="1" lang="en-GB" sz="850" strike="noStrike" u="none">
                 <a:solidFill>
                   <a:schemeClr val="accent1"/>
@@ -36480,10 +36480,21 @@
                 <a:latin typeface="Imperial Sans Text Medium"/>
                 <a:ea typeface="Inter Medium"/>
               </a:rPr>
-              <a:t>- Boundary conditions for u = cos(x</a:t>
+              <a:t>- Boundary conditions for </a:t>
             </a:r>
             <a:r>
-              <a:rPr b="0" lang="en-US" sz="1200" strike="noStrike" u="none" baseline="33000">
+              <a:rPr b="0" i="1" lang="en-US" sz="1200" strike="noStrike" u="none">
+                <a:solidFill>
+                  <a:schemeClr val="accent1"/>
+                </a:solidFill>
+                <a:uFillTx/>
+                <a:latin typeface="Imperial Sans Text Medium"/>
+                <a:ea typeface="Inter Medium"/>
+              </a:rPr>
+              <a:t>u = cos(x</a:t>
+            </a:r>
+            <a:r>
+              <a:rPr b="0" i="1" lang="en-US" sz="1200" strike="noStrike" u="none" baseline="33000">
                 <a:solidFill>
                   <a:schemeClr val="accent1"/>
                 </a:solidFill>
@@ -36494,7 +36505,7 @@
               <a:t>2</a:t>
             </a:r>
             <a:r>
-              <a:rPr b="0" lang="en-US" sz="1200" strike="noStrike" u="none">
+              <a:rPr b="0" i="1" lang="en-US" sz="1200" strike="noStrike" u="none">
                 <a:solidFill>
                   <a:schemeClr val="accent1"/>
                 </a:solidFill>
@@ -36769,7 +36780,7 @@
                 <a:latin typeface="Imperial Sans Text Medium"/>
                 <a:ea typeface="Inter Medium"/>
               </a:rPr>
-              <a:t>- Vectorise the solution matrix</a:t>
+              <a:t>- Vectorise the sampled solution matrix</a:t>
             </a:r>
             <a:endParaRPr b="0" lang="en-GB" sz="1200" strike="noStrike" u="none">
               <a:solidFill>
@@ -37699,7 +37710,7 @@
         </p:blipFill>
         <p:spPr>
           <a:xfrm>
-            <a:off x="5677920" y="4731480"/>
+            <a:off x="8863200" y="2090880"/>
             <a:ext cx="2915640" cy="1790280"/>
           </a:xfrm>
           <a:prstGeom prst="rect">
@@ -37723,7 +37734,7 @@
         </p:blipFill>
         <p:spPr>
           <a:xfrm>
-            <a:off x="5244120" y="1871280"/>
+            <a:off x="5244120" y="1479600"/>
             <a:ext cx="2584080" cy="2584080"/>
           </a:xfrm>
           <a:prstGeom prst="rect">
@@ -37747,8 +37758,8 @@
         </p:blipFill>
         <p:spPr>
           <a:xfrm>
-            <a:off x="8207280" y="1871280"/>
-            <a:ext cx="3917160" cy="2704320"/>
+            <a:off x="5911200" y="3973680"/>
+            <a:ext cx="5317560" cy="2678400"/>
           </a:xfrm>
           <a:prstGeom prst="rect">
             <a:avLst/>

</xml_diff>